<commit_message>
fixed a bug on DP
</commit_message>
<xml_diff>
--- a/02 - Dynamic Programming/slides.pptx
+++ b/02 - Dynamic Programming/slides.pptx
@@ -9780,7 +9780,15 @@
             <a:pPr lvl="0"/>
             <a:r>
               <a:rPr lang="en-GB" dirty="0"/>
-              <a:t>The process of making a new policy that improves an original policy by making it</a:t>
+              <a:t>The process of </a:t>
+            </a:r>
+            <a:r>
+              <a:rPr lang="en-GB" b="1" dirty="0"/>
+              <a:t>making a new policy </a:t>
+            </a:r>
+            <a:r>
+              <a:rPr lang="en-GB" dirty="0"/>
+              <a:t>that improves an original policy by making it</a:t>
             </a:r>
             <a:r>
               <a:rPr lang="en-GB" b="1" dirty="0"/>
@@ -9788,7 +9796,11 @@
             </a:r>
             <a:r>
               <a:rPr lang="en-GB" dirty="0"/>
-              <a:t>, is called policy improvement</a:t>
+              <a:t>, is called </a:t>
+            </a:r>
+            <a:r>
+              <a:rPr lang="en-GB" b="1" dirty="0"/>
+              <a:t>policy improvement</a:t>
             </a:r>
           </a:p>
           <a:p>
@@ -10360,7 +10372,7 @@
             </a:r>
             <a:r>
               <a:rPr lang="en-GB" dirty="0"/>
-              <a:t>over the previous one (unless it is already optimal). </a:t>
+              <a:t>over the previous one (unless it is already optimal)</a:t>
             </a:r>
           </a:p>
           <a:p>
@@ -10382,7 +10394,7 @@
           </a:p>
           <a:p>
             <a:r>
-              <a:rPr lang="en-GB" dirty="0">
+              <a:rPr lang="en-GB" b="1" dirty="0">
                 <a:highlight>
                   <a:srgbClr val="FFFF00"/>
                 </a:highlight>
@@ -10390,7 +10402,7 @@
               <a:t>See “policy-</a:t>
             </a:r>
             <a:r>
-              <a:rPr lang="en-GB" dirty="0" err="1">
+              <a:rPr lang="en-GB" b="1" dirty="0" err="1">
                 <a:highlight>
                   <a:srgbClr val="FFFF00"/>
                 </a:highlight>
@@ -10398,7 +10410,7 @@
               <a:t>iteration.ipynb</a:t>
             </a:r>
             <a:r>
-              <a:rPr lang="en-GB" dirty="0">
+              <a:rPr lang="en-GB" b="1" dirty="0">
                 <a:highlight>
                   <a:srgbClr val="FFFF00"/>
                 </a:highlight>
@@ -10600,7 +10612,11 @@
             </a:r>
             <a:r>
               <a:rPr lang="en-GB" dirty="0"/>
-              <a:t> evaluation after a single iteration</a:t>
+              <a:t> </a:t>
+            </a:r>
+            <a:r>
+              <a:rPr lang="en-GB" b="1" dirty="0"/>
+              <a:t>evaluation after a single iteration</a:t>
             </a:r>
           </a:p>
           <a:p>
@@ -10619,8 +10635,12 @@
           <a:p>
             <a:pPr lvl="1"/>
             <a:r>
-              <a:rPr lang="en-GB" dirty="0"/>
-              <a:t>don’t wait until we have an accurate estimate of the policy before improving</a:t>
+              <a:rPr lang="en-GB" b="1" dirty="0"/>
+              <a:t>don’t wait until we have an accurate estimate </a:t>
+            </a:r>
+            <a:r>
+              <a:rPr lang="en-GB" dirty="0"/>
+              <a:t>of the policy before improving</a:t>
             </a:r>
           </a:p>
           <a:p>
@@ -10648,7 +10668,7 @@
             <a:pPr lvl="1"/>
             <a:r>
               <a:rPr lang="en-GB" dirty="0"/>
-              <a:t>instead of improving the policy (by taking the argmax to get a better policy and then evaluating this improved policy to obtain a value function again)</a:t>
+              <a:t>instead of taking the argmax to get a better policy and then evaluate this improved policy to obtain a new value function</a:t>
             </a:r>
           </a:p>
           <a:p>
@@ -10682,10 +10702,10 @@
       </p:sp>
       <p:pic>
         <p:nvPicPr>
-          <p:cNvPr id="3" name="Immagine 2">
+          <p:cNvPr id="4" name="Immagine 3">
             <a:extLst>
               <a:ext uri="{FF2B5EF4-FFF2-40B4-BE49-F238E27FC236}">
-                <a16:creationId xmlns:a16="http://schemas.microsoft.com/office/drawing/2014/main" id="{4BDFCAA1-82C2-65D3-67CE-11523EB0262D}"/>
+                <a16:creationId xmlns:a16="http://schemas.microsoft.com/office/drawing/2014/main" id="{E1284947-41D3-6A0B-117D-33895F1395A7}"/>
               </a:ext>
             </a:extLst>
           </p:cNvPr>
@@ -10702,8 +10722,8 @@
         </p:blipFill>
         <p:spPr>
           <a:xfrm>
-            <a:off x="618191" y="4367306"/>
-            <a:ext cx="4787900" cy="812800"/>
+            <a:off x="790112" y="4439199"/>
+            <a:ext cx="4741046" cy="710157"/>
           </a:xfrm>
           <a:prstGeom prst="rect">
             <a:avLst/>
@@ -11060,16 +11080,24 @@
           <a:p>
             <a:r>
               <a:rPr lang="en-GB" dirty="0"/>
-              <a:t>While the goal is the same as of policy iteration (to find the optimal policy) it happens to do this through the value functions (thus the name)</a:t>
-            </a:r>
-          </a:p>
-          <a:p>
-            <a:endParaRPr lang="en-GB" dirty="0"/>
-          </a:p>
-          <a:p>
-            <a:r>
-              <a:rPr lang="en-GB" dirty="0"/>
-              <a:t>Only at the end of the algorithm, after the value function converges to the optimal, do we extract the optimal policy by taking the argmax over the actions of the Q-function.</a:t>
+              <a:t>While the goal is the same as of policy iteration (to find the optimal policy) </a:t>
+            </a:r>
+            <a:r>
+              <a:rPr lang="en-GB" b="1" dirty="0"/>
+              <a:t>it happens to do this through the value functions </a:t>
+            </a:r>
+            <a:r>
+              <a:rPr lang="en-GB" dirty="0"/>
+              <a:t>(thus the name)</a:t>
+            </a:r>
+          </a:p>
+          <a:p>
+            <a:endParaRPr lang="en-GB" dirty="0"/>
+          </a:p>
+          <a:p>
+            <a:r>
+              <a:rPr lang="en-GB" dirty="0"/>
+              <a:t>Only at the end of the algorithm, after the value function converges to the optimal, do we extract the optimal policy by taking the argmax over the actions of the action-value function</a:t>
             </a:r>
           </a:p>
           <a:p>
@@ -11082,7 +11110,7 @@
                   <a:srgbClr val="FFFF00"/>
                 </a:highlight>
               </a:rPr>
-              <a:t>See “Value-</a:t>
+              <a:t>See “value-</a:t>
             </a:r>
             <a:r>
               <a:rPr lang="en-GB" b="1" dirty="0" err="1">
@@ -11237,6 +11265,10 @@
             </a:r>
           </a:p>
           <a:p>
+            <a:pPr lvl="1"/>
+            <a:endParaRPr lang="en-GB" dirty="0"/>
+          </a:p>
+          <a:p>
             <a:pPr lvl="0"/>
             <a:r>
               <a:rPr lang="en-GB" dirty="0"/>
@@ -11281,7 +11313,7 @@
             </a:r>
             <a:r>
               <a:rPr lang="en-GB" dirty="0"/>
-              <a:t>are iterative algorithms that are not organized in terms of systematic sweeps of the state set. </a:t>
+              <a:t>are iterative algorithms that are not organized in terms of systematic sweeps of the state set </a:t>
             </a:r>
           </a:p>
           <a:p>
@@ -11437,7 +11469,7 @@
             <a:pPr lvl="1"/>
             <a:r>
               <a:rPr lang="en-GB" dirty="0"/>
-              <a:t>only a single iteration of evaluation is performed before each policy improvement;</a:t>
+              <a:t>only a single iteration of evaluation is performed before each policy improvement</a:t>
             </a:r>
           </a:p>
           <a:p>

</xml_diff>